<commit_message>
change Section parser logic
</commit_message>
<xml_diff>
--- a/luna_authoring_system/ppt_parser/test/test_assets/Sections.pptx
+++ b/luna_authoring_system/ppt_parser/test/test_assets/Sections.pptx
@@ -9,6 +9,9 @@
     <p:sldId id="257" r:id="rId3"/>
     <p:sldId id="258" r:id="rId4"/>
     <p:sldId id="259" r:id="rId5"/>
+    <p:sldId id="260" r:id="rId6"/>
+    <p:sldId id="261" r:id="rId7"/>
+    <p:sldId id="262" r:id="rId8"/>
   </p:sldIdLst>
   <p:sldSz cx="12192000" cy="6858000"/>
   <p:notesSz cx="6858000" cy="9144000"/>
@@ -125,6 +128,13 @@
         <p14:section name="Section 3" id="{ED139EDB-E98D-6F4A-9F8B-88A9F12FF1A7}">
           <p14:sldIdLst/>
         </p14:section>
+        <p14:section name="Section 4" id="{DE46CF05-7B11-8945-8DED-29E8ACCCA39B}">
+          <p14:sldIdLst>
+            <p14:sldId id="260"/>
+            <p14:sldId id="261"/>
+            <p14:sldId id="262"/>
+          </p14:sldIdLst>
+        </p14:section>
       </p14:sectionLst>
     </p:ext>
     <p:ext uri="{EFAFB233-063F-42B5-8137-9DF3F51BA10A}">
@@ -281,7 +291,7 @@
           <a:p>
             <a:fld id="{5D6D0EBF-D941-1E4E-8AD7-77403B50F4CF}" type="datetimeFigureOut">
               <a:rPr lang="en-US" smtClean="0"/>
-              <a:t>4/11/24</a:t>
+              <a:t>4/22/24</a:t>
             </a:fld>
             <a:endParaRPr lang="en-US"/>
           </a:p>
@@ -479,7 +489,7 @@
           <a:p>
             <a:fld id="{5D6D0EBF-D941-1E4E-8AD7-77403B50F4CF}" type="datetimeFigureOut">
               <a:rPr lang="en-US" smtClean="0"/>
-              <a:t>4/11/24</a:t>
+              <a:t>4/22/24</a:t>
             </a:fld>
             <a:endParaRPr lang="en-US"/>
           </a:p>
@@ -687,7 +697,7 @@
           <a:p>
             <a:fld id="{5D6D0EBF-D941-1E4E-8AD7-77403B50F4CF}" type="datetimeFigureOut">
               <a:rPr lang="en-US" smtClean="0"/>
-              <a:t>4/11/24</a:t>
+              <a:t>4/22/24</a:t>
             </a:fld>
             <a:endParaRPr lang="en-US"/>
           </a:p>
@@ -885,7 +895,7 @@
           <a:p>
             <a:fld id="{5D6D0EBF-D941-1E4E-8AD7-77403B50F4CF}" type="datetimeFigureOut">
               <a:rPr lang="en-US" smtClean="0"/>
-              <a:t>4/11/24</a:t>
+              <a:t>4/22/24</a:t>
             </a:fld>
             <a:endParaRPr lang="en-US"/>
           </a:p>
@@ -1160,7 +1170,7 @@
           <a:p>
             <a:fld id="{5D6D0EBF-D941-1E4E-8AD7-77403B50F4CF}" type="datetimeFigureOut">
               <a:rPr lang="en-US" smtClean="0"/>
-              <a:t>4/11/24</a:t>
+              <a:t>4/22/24</a:t>
             </a:fld>
             <a:endParaRPr lang="en-US"/>
           </a:p>
@@ -1425,7 +1435,7 @@
           <a:p>
             <a:fld id="{5D6D0EBF-D941-1E4E-8AD7-77403B50F4CF}" type="datetimeFigureOut">
               <a:rPr lang="en-US" smtClean="0"/>
-              <a:t>4/11/24</a:t>
+              <a:t>4/22/24</a:t>
             </a:fld>
             <a:endParaRPr lang="en-US"/>
           </a:p>
@@ -1837,7 +1847,7 @@
           <a:p>
             <a:fld id="{5D6D0EBF-D941-1E4E-8AD7-77403B50F4CF}" type="datetimeFigureOut">
               <a:rPr lang="en-US" smtClean="0"/>
-              <a:t>4/11/24</a:t>
+              <a:t>4/22/24</a:t>
             </a:fld>
             <a:endParaRPr lang="en-US"/>
           </a:p>
@@ -1978,7 +1988,7 @@
           <a:p>
             <a:fld id="{5D6D0EBF-D941-1E4E-8AD7-77403B50F4CF}" type="datetimeFigureOut">
               <a:rPr lang="en-US" smtClean="0"/>
-              <a:t>4/11/24</a:t>
+              <a:t>4/22/24</a:t>
             </a:fld>
             <a:endParaRPr lang="en-US"/>
           </a:p>
@@ -2091,7 +2101,7 @@
           <a:p>
             <a:fld id="{5D6D0EBF-D941-1E4E-8AD7-77403B50F4CF}" type="datetimeFigureOut">
               <a:rPr lang="en-US" smtClean="0"/>
-              <a:t>4/11/24</a:t>
+              <a:t>4/22/24</a:t>
             </a:fld>
             <a:endParaRPr lang="en-US"/>
           </a:p>
@@ -2402,7 +2412,7 @@
           <a:p>
             <a:fld id="{5D6D0EBF-D941-1E4E-8AD7-77403B50F4CF}" type="datetimeFigureOut">
               <a:rPr lang="en-US" smtClean="0"/>
-              <a:t>4/11/24</a:t>
+              <a:t>4/22/24</a:t>
             </a:fld>
             <a:endParaRPr lang="en-US"/>
           </a:p>
@@ -2690,7 +2700,7 @@
           <a:p>
             <a:fld id="{5D6D0EBF-D941-1E4E-8AD7-77403B50F4CF}" type="datetimeFigureOut">
               <a:rPr lang="en-US" smtClean="0"/>
-              <a:t>4/11/24</a:t>
+              <a:t>4/22/24</a:t>
             </a:fld>
             <a:endParaRPr lang="en-US"/>
           </a:p>
@@ -2931,7 +2941,7 @@
           <a:p>
             <a:fld id="{5D6D0EBF-D941-1E4E-8AD7-77403B50F4CF}" type="datetimeFigureOut">
               <a:rPr lang="en-US" smtClean="0"/>
-              <a:t>4/11/24</a:t>
+              <a:t>4/22/24</a:t>
             </a:fld>
             <a:endParaRPr lang="en-US"/>
           </a:p>
@@ -3424,7 +3434,7 @@
           <a:p>
             <a:r>
               <a:rPr lang="en-KR" dirty="0"/>
-              <a:t>I am in the default section.</a:t>
+              <a:t>Default section</a:t>
             </a:r>
           </a:p>
         </p:txBody>
@@ -3489,7 +3499,7 @@
           <a:p>
             <a:r>
               <a:rPr lang="en-KR" dirty="0"/>
-              <a:t>I am in the section 2, and am the first text box.</a:t>
+              <a:t>section 2, text box 1</a:t>
             </a:r>
           </a:p>
         </p:txBody>
@@ -3539,7 +3549,7 @@
         <p:spPr>
           <a:xfrm>
             <a:off x="1746607" y="1530849"/>
-            <a:ext cx="4746660" cy="646331"/>
+            <a:ext cx="4746660" cy="369332"/>
           </a:xfrm>
           <a:prstGeom prst="rect">
             <a:avLst/>
@@ -3554,7 +3564,7 @@
           <a:p>
             <a:r>
               <a:rPr lang="en-KR" dirty="0"/>
-              <a:t>I am in the section 2, and am the second text box.</a:t>
+              <a:t>section 2, text box 2</a:t>
             </a:r>
           </a:p>
         </p:txBody>
@@ -3619,7 +3629,7 @@
           <a:p>
             <a:r>
               <a:rPr lang="en-KR" dirty="0"/>
-              <a:t>I am in the section 2, and am the third text box.</a:t>
+              <a:t>section 2, text box 3</a:t>
             </a:r>
           </a:p>
         </p:txBody>
@@ -3628,6 +3638,201 @@
     <p:extLst>
       <p:ext uri="{BB962C8B-B14F-4D97-AF65-F5344CB8AC3E}">
         <p14:creationId xmlns:p14="http://schemas.microsoft.com/office/powerpoint/2010/main" val="4269350647"/>
+      </p:ext>
+    </p:extLst>
+  </p:cSld>
+  <p:clrMapOvr>
+    <a:masterClrMapping/>
+  </p:clrMapOvr>
+</p:sld>
+</file>
+
+<file path=ppt/slides/slide5.xml><?xml version="1.0" encoding="utf-8"?>
+<p:sld xmlns:a="http://schemas.openxmlformats.org/drawingml/2006/main" xmlns:r="http://schemas.openxmlformats.org/officeDocument/2006/relationships" xmlns:p="http://schemas.openxmlformats.org/presentationml/2006/main">
+  <p:cSld>
+    <p:spTree>
+      <p:nvGrpSpPr>
+        <p:cNvPr id="1" name=""/>
+        <p:cNvGrpSpPr/>
+        <p:nvPr/>
+      </p:nvGrpSpPr>
+      <p:grpSpPr>
+        <a:xfrm>
+          <a:off x="0" y="0"/>
+          <a:ext cx="0" cy="0"/>
+          <a:chOff x="0" y="0"/>
+          <a:chExt cx="0" cy="0"/>
+        </a:xfrm>
+      </p:grpSpPr>
+      <p:sp>
+        <p:nvSpPr>
+          <p:cNvPr id="2" name="TextBox 1">
+            <a:extLst>
+              <a:ext uri="{FF2B5EF4-FFF2-40B4-BE49-F238E27FC236}">
+                <a16:creationId xmlns:a16="http://schemas.microsoft.com/office/drawing/2014/main" id="{8BC4356A-2CB8-DB72-8366-330DF94A7CE2}"/>
+              </a:ext>
+            </a:extLst>
+          </p:cNvPr>
+          <p:cNvSpPr txBox="1"/>
+          <p:nvPr/>
+        </p:nvSpPr>
+        <p:spPr>
+          <a:xfrm>
+            <a:off x="1746607" y="1530849"/>
+            <a:ext cx="4746660" cy="369332"/>
+          </a:xfrm>
+          <a:prstGeom prst="rect">
+            <a:avLst/>
+          </a:prstGeom>
+          <a:noFill/>
+        </p:spPr>
+        <p:txBody>
+          <a:bodyPr wrap="square" rtlCol="0">
+            <a:spAutoFit/>
+          </a:bodyPr>
+          <a:lstStyle/>
+          <a:p>
+            <a:r>
+              <a:rPr lang="en-KR" dirty="0"/>
+              <a:t>section 4, text box 1</a:t>
+            </a:r>
+          </a:p>
+        </p:txBody>
+      </p:sp>
+    </p:spTree>
+    <p:extLst>
+      <p:ext uri="{BB962C8B-B14F-4D97-AF65-F5344CB8AC3E}">
+        <p14:creationId xmlns:p14="http://schemas.microsoft.com/office/powerpoint/2010/main" val="3187639933"/>
+      </p:ext>
+    </p:extLst>
+  </p:cSld>
+  <p:clrMapOvr>
+    <a:masterClrMapping/>
+  </p:clrMapOvr>
+</p:sld>
+</file>
+
+<file path=ppt/slides/slide6.xml><?xml version="1.0" encoding="utf-8"?>
+<p:sld xmlns:a="http://schemas.openxmlformats.org/drawingml/2006/main" xmlns:r="http://schemas.openxmlformats.org/officeDocument/2006/relationships" xmlns:p="http://schemas.openxmlformats.org/presentationml/2006/main">
+  <p:cSld>
+    <p:spTree>
+      <p:nvGrpSpPr>
+        <p:cNvPr id="1" name=""/>
+        <p:cNvGrpSpPr/>
+        <p:nvPr/>
+      </p:nvGrpSpPr>
+      <p:grpSpPr>
+        <a:xfrm>
+          <a:off x="0" y="0"/>
+          <a:ext cx="0" cy="0"/>
+          <a:chOff x="0" y="0"/>
+          <a:chExt cx="0" cy="0"/>
+        </a:xfrm>
+      </p:grpSpPr>
+      <p:sp>
+        <p:nvSpPr>
+          <p:cNvPr id="2" name="TextBox 1">
+            <a:extLst>
+              <a:ext uri="{FF2B5EF4-FFF2-40B4-BE49-F238E27FC236}">
+                <a16:creationId xmlns:a16="http://schemas.microsoft.com/office/drawing/2014/main" id="{8BC4356A-2CB8-DB72-8366-330DF94A7CE2}"/>
+              </a:ext>
+            </a:extLst>
+          </p:cNvPr>
+          <p:cNvSpPr txBox="1"/>
+          <p:nvPr/>
+        </p:nvSpPr>
+        <p:spPr>
+          <a:xfrm>
+            <a:off x="1746607" y="1530849"/>
+            <a:ext cx="4746660" cy="369332"/>
+          </a:xfrm>
+          <a:prstGeom prst="rect">
+            <a:avLst/>
+          </a:prstGeom>
+          <a:noFill/>
+        </p:spPr>
+        <p:txBody>
+          <a:bodyPr wrap="square" rtlCol="0">
+            <a:spAutoFit/>
+          </a:bodyPr>
+          <a:lstStyle/>
+          <a:p>
+            <a:r>
+              <a:rPr lang="en-KR" dirty="0"/>
+              <a:t>section 4, text box 2</a:t>
+            </a:r>
+          </a:p>
+        </p:txBody>
+      </p:sp>
+    </p:spTree>
+    <p:extLst>
+      <p:ext uri="{BB962C8B-B14F-4D97-AF65-F5344CB8AC3E}">
+        <p14:creationId xmlns:p14="http://schemas.microsoft.com/office/powerpoint/2010/main" val="2889310352"/>
+      </p:ext>
+    </p:extLst>
+  </p:cSld>
+  <p:clrMapOvr>
+    <a:masterClrMapping/>
+  </p:clrMapOvr>
+</p:sld>
+</file>
+
+<file path=ppt/slides/slide7.xml><?xml version="1.0" encoding="utf-8"?>
+<p:sld xmlns:a="http://schemas.openxmlformats.org/drawingml/2006/main" xmlns:r="http://schemas.openxmlformats.org/officeDocument/2006/relationships" xmlns:p="http://schemas.openxmlformats.org/presentationml/2006/main">
+  <p:cSld>
+    <p:spTree>
+      <p:nvGrpSpPr>
+        <p:cNvPr id="1" name=""/>
+        <p:cNvGrpSpPr/>
+        <p:nvPr/>
+      </p:nvGrpSpPr>
+      <p:grpSpPr>
+        <a:xfrm>
+          <a:off x="0" y="0"/>
+          <a:ext cx="0" cy="0"/>
+          <a:chOff x="0" y="0"/>
+          <a:chExt cx="0" cy="0"/>
+        </a:xfrm>
+      </p:grpSpPr>
+      <p:sp>
+        <p:nvSpPr>
+          <p:cNvPr id="2" name="TextBox 1">
+            <a:extLst>
+              <a:ext uri="{FF2B5EF4-FFF2-40B4-BE49-F238E27FC236}">
+                <a16:creationId xmlns:a16="http://schemas.microsoft.com/office/drawing/2014/main" id="{8BC4356A-2CB8-DB72-8366-330DF94A7CE2}"/>
+              </a:ext>
+            </a:extLst>
+          </p:cNvPr>
+          <p:cNvSpPr txBox="1"/>
+          <p:nvPr/>
+        </p:nvSpPr>
+        <p:spPr>
+          <a:xfrm>
+            <a:off x="1746607" y="1530849"/>
+            <a:ext cx="4746660" cy="369332"/>
+          </a:xfrm>
+          <a:prstGeom prst="rect">
+            <a:avLst/>
+          </a:prstGeom>
+          <a:noFill/>
+        </p:spPr>
+        <p:txBody>
+          <a:bodyPr wrap="square" rtlCol="0">
+            <a:spAutoFit/>
+          </a:bodyPr>
+          <a:lstStyle/>
+          <a:p>
+            <a:r>
+              <a:rPr lang="en-KR" dirty="0"/>
+              <a:t>section 4, text box 3</a:t>
+            </a:r>
+          </a:p>
+        </p:txBody>
+      </p:sp>
+    </p:spTree>
+    <p:extLst>
+      <p:ext uri="{BB962C8B-B14F-4D97-AF65-F5344CB8AC3E}">
+        <p14:creationId xmlns:p14="http://schemas.microsoft.com/office/powerpoint/2010/main" val="1633815131"/>
       </p:ext>
     </p:extLst>
   </p:cSld>

</xml_diff>